<commit_message>
Reducing plots spacing and sizes in power point
</commit_message>
<xml_diff>
--- a/Combined_Plots_Presentation.pptx
+++ b/Combined_Plots_Presentation.pptx
@@ -3116,14 +3116,14 @@
           <a:lstStyle/>
           <a:p>
             <a:r>
-              <a:t>Basic Average Shares.png</a:t>
+              <a:t>Cost of Revenue.png</a:t>
             </a:r>
           </a:p>
         </p:txBody>
       </p:sp>
       <p:pic>
         <p:nvPicPr>
-          <p:cNvPr id="3" name="Picture 2" descr="ADDYY_Basic_Average_Shares.png"/>
+          <p:cNvPr id="3" name="Picture 2" descr="ZS_Cost_of_Revenue.png"/>
           <p:cNvPicPr>
             <a:picLocks noChangeAspect="1"/>
           </p:cNvPicPr>
@@ -3137,8 +3137,8 @@
         </p:blipFill>
         <p:spPr>
           <a:xfrm>
-            <a:off x="914400" y="1371600"/>
-            <a:ext cx="4267200" cy="3200400"/>
+            <a:off x="457200" y="1371600"/>
+            <a:ext cx="3657600" cy="2743200"/>
           </a:xfrm>
           <a:prstGeom prst="rect">
             <a:avLst/>
@@ -3147,7 +3147,7 @@
       </p:pic>
       <p:pic>
         <p:nvPicPr>
-          <p:cNvPr id="4" name="Picture 3" descr="NKE_Basic_Average_Shares.png"/>
+          <p:cNvPr id="4" name="Picture 3" descr="S_Cost_of_Revenue.png"/>
           <p:cNvPicPr>
             <a:picLocks noChangeAspect="1"/>
           </p:cNvPicPr>
@@ -3161,8 +3161,8 @@
         </p:blipFill>
         <p:spPr>
           <a:xfrm>
-            <a:off x="5029200" y="1371600"/>
-            <a:ext cx="4267200" cy="3200400"/>
+            <a:off x="4572000" y="1371600"/>
+            <a:ext cx="3657600" cy="2743200"/>
           </a:xfrm>
           <a:prstGeom prst="rect">
             <a:avLst/>
@@ -3171,7 +3171,7 @@
       </p:pic>
       <p:pic>
         <p:nvPicPr>
-          <p:cNvPr id="5" name="Picture 4" descr="DECK_Basic_Average_Shares.png"/>
+          <p:cNvPr id="5" name="Picture 4" descr="CRWD_Cost_of_Revenue.png"/>
           <p:cNvPicPr>
             <a:picLocks noChangeAspect="1"/>
           </p:cNvPicPr>
@@ -3185,8 +3185,32 @@
         </p:blipFill>
         <p:spPr>
           <a:xfrm>
-            <a:off x="914400" y="5029200"/>
-            <a:ext cx="4267200" cy="3200400"/>
+            <a:off x="457200" y="4114800"/>
+            <a:ext cx="3657600" cy="2743200"/>
+          </a:xfrm>
+          <a:prstGeom prst="rect">
+            <a:avLst/>
+          </a:prstGeom>
+        </p:spPr>
+      </p:pic>
+      <p:pic>
+        <p:nvPicPr>
+          <p:cNvPr id="6" name="Picture 5" descr="PANW_Cost_of_Revenue.png"/>
+          <p:cNvPicPr>
+            <a:picLocks noChangeAspect="1"/>
+          </p:cNvPicPr>
+          <p:nvPr/>
+        </p:nvPicPr>
+        <p:blipFill>
+          <a:blip r:embed="rId5"/>
+          <a:stretch>
+            <a:fillRect/>
+          </a:stretch>
+        </p:blipFill>
+        <p:spPr>
+          <a:xfrm>
+            <a:off x="4572000" y="4114800"/>
+            <a:ext cx="3657600" cy="2743200"/>
           </a:xfrm>
           <a:prstGeom prst="rect">
             <a:avLst/>
@@ -3234,7 +3258,7 @@
       </p:sp>
       <p:pic>
         <p:nvPicPr>
-          <p:cNvPr id="3" name="Picture 2" descr="DECK_Total_Debt.png"/>
+          <p:cNvPr id="3" name="Picture 2" descr="S_Total_Debt.png"/>
           <p:cNvPicPr>
             <a:picLocks noChangeAspect="1"/>
           </p:cNvPicPr>
@@ -3248,8 +3272,8 @@
         </p:blipFill>
         <p:spPr>
           <a:xfrm>
-            <a:off x="914400" y="1371600"/>
-            <a:ext cx="4267200" cy="3200400"/>
+            <a:off x="457200" y="1371600"/>
+            <a:ext cx="3657600" cy="2743200"/>
           </a:xfrm>
           <a:prstGeom prst="rect">
             <a:avLst/>
@@ -3258,7 +3282,7 @@
       </p:pic>
       <p:pic>
         <p:nvPicPr>
-          <p:cNvPr id="4" name="Picture 3" descr="NKE_Total_Debt.png"/>
+          <p:cNvPr id="4" name="Picture 3" descr="ZS_Total_Debt.png"/>
           <p:cNvPicPr>
             <a:picLocks noChangeAspect="1"/>
           </p:cNvPicPr>
@@ -3272,8 +3296,8 @@
         </p:blipFill>
         <p:spPr>
           <a:xfrm>
-            <a:off x="5029200" y="1371600"/>
-            <a:ext cx="4267200" cy="3200400"/>
+            <a:off x="4572000" y="1371600"/>
+            <a:ext cx="3657600" cy="2743200"/>
           </a:xfrm>
           <a:prstGeom prst="rect">
             <a:avLst/>
@@ -3282,7 +3306,7 @@
       </p:pic>
       <p:pic>
         <p:nvPicPr>
-          <p:cNvPr id="5" name="Picture 4" descr="ADDYY_Total_Debt.png"/>
+          <p:cNvPr id="5" name="Picture 4" descr="PANW_Total_Debt.png"/>
           <p:cNvPicPr>
             <a:picLocks noChangeAspect="1"/>
           </p:cNvPicPr>
@@ -3296,8 +3320,32 @@
         </p:blipFill>
         <p:spPr>
           <a:xfrm>
-            <a:off x="914400" y="5029200"/>
-            <a:ext cx="4267200" cy="3200400"/>
+            <a:off x="457200" y="4114800"/>
+            <a:ext cx="3657600" cy="2743200"/>
+          </a:xfrm>
+          <a:prstGeom prst="rect">
+            <a:avLst/>
+          </a:prstGeom>
+        </p:spPr>
+      </p:pic>
+      <p:pic>
+        <p:nvPicPr>
+          <p:cNvPr id="6" name="Picture 5" descr="CRWD_Total_Debt.png"/>
+          <p:cNvPicPr>
+            <a:picLocks noChangeAspect="1"/>
+          </p:cNvPicPr>
+          <p:nvPr/>
+        </p:nvPicPr>
+        <p:blipFill>
+          <a:blip r:embed="rId5"/>
+          <a:stretch>
+            <a:fillRect/>
+          </a:stretch>
+        </p:blipFill>
+        <p:spPr>
+          <a:xfrm>
+            <a:off x="4572000" y="4114800"/>
+            <a:ext cx="3657600" cy="2743200"/>
           </a:xfrm>
           <a:prstGeom prst="rect">
             <a:avLst/>
@@ -3345,7 +3393,7 @@
       </p:sp>
       <p:pic>
         <p:nvPicPr>
-          <p:cNvPr id="3" name="Picture 2" descr="ADDYY_Total_Assets.png"/>
+          <p:cNvPr id="3" name="Picture 2" descr="S_Total_Assets.png"/>
           <p:cNvPicPr>
             <a:picLocks noChangeAspect="1"/>
           </p:cNvPicPr>
@@ -3359,8 +3407,8 @@
         </p:blipFill>
         <p:spPr>
           <a:xfrm>
-            <a:off x="914400" y="1371600"/>
-            <a:ext cx="4267200" cy="3200400"/>
+            <a:off x="457200" y="1371600"/>
+            <a:ext cx="3657600" cy="2743200"/>
           </a:xfrm>
           <a:prstGeom prst="rect">
             <a:avLst/>
@@ -3369,7 +3417,7 @@
       </p:pic>
       <p:pic>
         <p:nvPicPr>
-          <p:cNvPr id="4" name="Picture 3" descr="NKE_Total_Assets.png"/>
+          <p:cNvPr id="4" name="Picture 3" descr="ZS_Total_Assets.png"/>
           <p:cNvPicPr>
             <a:picLocks noChangeAspect="1"/>
           </p:cNvPicPr>
@@ -3383,8 +3431,8 @@
         </p:blipFill>
         <p:spPr>
           <a:xfrm>
-            <a:off x="5029200" y="1371600"/>
-            <a:ext cx="4267200" cy="3200400"/>
+            <a:off x="4572000" y="1371600"/>
+            <a:ext cx="3657600" cy="2743200"/>
           </a:xfrm>
           <a:prstGeom prst="rect">
             <a:avLst/>
@@ -3393,7 +3441,7 @@
       </p:pic>
       <p:pic>
         <p:nvPicPr>
-          <p:cNvPr id="5" name="Picture 4" descr="DECK_Total_Assets.png"/>
+          <p:cNvPr id="5" name="Picture 4" descr="CRWD_Total_Assets.png"/>
           <p:cNvPicPr>
             <a:picLocks noChangeAspect="1"/>
           </p:cNvPicPr>
@@ -3407,8 +3455,32 @@
         </p:blipFill>
         <p:spPr>
           <a:xfrm>
-            <a:off x="914400" y="5029200"/>
-            <a:ext cx="4267200" cy="3200400"/>
+            <a:off x="457200" y="4114800"/>
+            <a:ext cx="3657600" cy="2743200"/>
+          </a:xfrm>
+          <a:prstGeom prst="rect">
+            <a:avLst/>
+          </a:prstGeom>
+        </p:spPr>
+      </p:pic>
+      <p:pic>
+        <p:nvPicPr>
+          <p:cNvPr id="6" name="Picture 5" descr="PANW_Total_Assets.png"/>
+          <p:cNvPicPr>
+            <a:picLocks noChangeAspect="1"/>
+          </p:cNvPicPr>
+          <p:nvPr/>
+        </p:nvPicPr>
+        <p:blipFill>
+          <a:blip r:embed="rId5"/>
+          <a:stretch>
+            <a:fillRect/>
+          </a:stretch>
+        </p:blipFill>
+        <p:spPr>
+          <a:xfrm>
+            <a:off x="4572000" y="4114800"/>
+            <a:ext cx="3657600" cy="2743200"/>
           </a:xfrm>
           <a:prstGeom prst="rect">
             <a:avLst/>
@@ -3449,14 +3521,14 @@
           <a:lstStyle/>
           <a:p>
             <a:r>
-              <a:t>Repurchase of Capital Stock.png</a:t>
+              <a:t>Free Cash Flow.png</a:t>
             </a:r>
           </a:p>
         </p:txBody>
       </p:sp>
       <p:pic>
         <p:nvPicPr>
-          <p:cNvPr id="3" name="Picture 2" descr="ADDYY_Repurchase_of_Capital_Stock.png"/>
+          <p:cNvPr id="3" name="Picture 2" descr="PANW_Free_Cash_Flow.png"/>
           <p:cNvPicPr>
             <a:picLocks noChangeAspect="1"/>
           </p:cNvPicPr>
@@ -3470,8 +3542,8 @@
         </p:blipFill>
         <p:spPr>
           <a:xfrm>
-            <a:off x="914400" y="1371600"/>
-            <a:ext cx="4267200" cy="3200400"/>
+            <a:off x="457200" y="1371600"/>
+            <a:ext cx="3657600" cy="2743200"/>
           </a:xfrm>
           <a:prstGeom prst="rect">
             <a:avLst/>
@@ -3480,7 +3552,7 @@
       </p:pic>
       <p:pic>
         <p:nvPicPr>
-          <p:cNvPr id="4" name="Picture 3" descr="NKE_Repurchase_of_Capital_Stock.png"/>
+          <p:cNvPr id="4" name="Picture 3" descr="CRWD_Free_Cash_Flow.png"/>
           <p:cNvPicPr>
             <a:picLocks noChangeAspect="1"/>
           </p:cNvPicPr>
@@ -3494,8 +3566,8 @@
         </p:blipFill>
         <p:spPr>
           <a:xfrm>
-            <a:off x="5029200" y="1371600"/>
-            <a:ext cx="4267200" cy="3200400"/>
+            <a:off x="4572000" y="1371600"/>
+            <a:ext cx="3657600" cy="2743200"/>
           </a:xfrm>
           <a:prstGeom prst="rect">
             <a:avLst/>
@@ -3504,7 +3576,7 @@
       </p:pic>
       <p:pic>
         <p:nvPicPr>
-          <p:cNvPr id="5" name="Picture 4" descr="DECK_Repurchase_of_Capital_Stock.png"/>
+          <p:cNvPr id="5" name="Picture 4" descr="ZS_Free_Cash_Flow.png"/>
           <p:cNvPicPr>
             <a:picLocks noChangeAspect="1"/>
           </p:cNvPicPr>
@@ -3518,8 +3590,32 @@
         </p:blipFill>
         <p:spPr>
           <a:xfrm>
-            <a:off x="914400" y="5029200"/>
-            <a:ext cx="4267200" cy="3200400"/>
+            <a:off x="457200" y="4114800"/>
+            <a:ext cx="3657600" cy="2743200"/>
+          </a:xfrm>
+          <a:prstGeom prst="rect">
+            <a:avLst/>
+          </a:prstGeom>
+        </p:spPr>
+      </p:pic>
+      <p:pic>
+        <p:nvPicPr>
+          <p:cNvPr id="6" name="Picture 5" descr="S_Free_Cash_Flow.png"/>
+          <p:cNvPicPr>
+            <a:picLocks noChangeAspect="1"/>
+          </p:cNvPicPr>
+          <p:nvPr/>
+        </p:nvPicPr>
+        <p:blipFill>
+          <a:blip r:embed="rId5"/>
+          <a:stretch>
+            <a:fillRect/>
+          </a:stretch>
+        </p:blipFill>
+        <p:spPr>
+          <a:xfrm>
+            <a:off x="4572000" y="4114800"/>
+            <a:ext cx="3657600" cy="2743200"/>
           </a:xfrm>
           <a:prstGeom prst="rect">
             <a:avLst/>
@@ -3560,14 +3656,14 @@
           <a:lstStyle/>
           <a:p>
             <a:r>
-              <a:t>Free Cash Flow.png</a:t>
+              <a:t>Repurchase of Capital Stock.png</a:t>
             </a:r>
           </a:p>
         </p:txBody>
       </p:sp>
       <p:pic>
         <p:nvPicPr>
-          <p:cNvPr id="3" name="Picture 2" descr="ADDYY_Free_Cash_Flow.png"/>
+          <p:cNvPr id="3" name="Picture 2" descr="ZS_Repurchase_of_Capital_Stock.png"/>
           <p:cNvPicPr>
             <a:picLocks noChangeAspect="1"/>
           </p:cNvPicPr>
@@ -3581,8 +3677,8 @@
         </p:blipFill>
         <p:spPr>
           <a:xfrm>
-            <a:off x="914400" y="1371600"/>
-            <a:ext cx="4267200" cy="3200400"/>
+            <a:off x="457200" y="1371600"/>
+            <a:ext cx="3657600" cy="2743200"/>
           </a:xfrm>
           <a:prstGeom prst="rect">
             <a:avLst/>
@@ -3591,7 +3687,7 @@
       </p:pic>
       <p:pic>
         <p:nvPicPr>
-          <p:cNvPr id="4" name="Picture 3" descr="DECK_Free_Cash_Flow.png"/>
+          <p:cNvPr id="4" name="Picture 3" descr="PANW_Repurchase_of_Capital_Stock.png"/>
           <p:cNvPicPr>
             <a:picLocks noChangeAspect="1"/>
           </p:cNvPicPr>
@@ -3605,32 +3701,8 @@
         </p:blipFill>
         <p:spPr>
           <a:xfrm>
-            <a:off x="5029200" y="1371600"/>
-            <a:ext cx="4267200" cy="3200400"/>
-          </a:xfrm>
-          <a:prstGeom prst="rect">
-            <a:avLst/>
-          </a:prstGeom>
-        </p:spPr>
-      </p:pic>
-      <p:pic>
-        <p:nvPicPr>
-          <p:cNvPr id="5" name="Picture 4" descr="NKE_Free_Cash_Flow.png"/>
-          <p:cNvPicPr>
-            <a:picLocks noChangeAspect="1"/>
-          </p:cNvPicPr>
-          <p:nvPr/>
-        </p:nvPicPr>
-        <p:blipFill>
-          <a:blip r:embed="rId4"/>
-          <a:stretch>
-            <a:fillRect/>
-          </a:stretch>
-        </p:blipFill>
-        <p:spPr>
-          <a:xfrm>
-            <a:off x="914400" y="5029200"/>
-            <a:ext cx="4267200" cy="3200400"/>
+            <a:off x="4572000" y="1371600"/>
+            <a:ext cx="3657600" cy="2743200"/>
           </a:xfrm>
           <a:prstGeom prst="rect">
             <a:avLst/>
@@ -3671,14 +3743,14 @@
           <a:lstStyle/>
           <a:p>
             <a:r>
-              <a:t>Total Expenses.png</a:t>
+              <a:t>Gross Profit.png</a:t>
             </a:r>
           </a:p>
         </p:txBody>
       </p:sp>
       <p:pic>
         <p:nvPicPr>
-          <p:cNvPr id="3" name="Picture 2" descr="NKE_Total_Expenses.png"/>
+          <p:cNvPr id="3" name="Picture 2" descr="CRWD_Gross_Profit.png"/>
           <p:cNvPicPr>
             <a:picLocks noChangeAspect="1"/>
           </p:cNvPicPr>
@@ -3692,8 +3764,8 @@
         </p:blipFill>
         <p:spPr>
           <a:xfrm>
-            <a:off x="914400" y="1371600"/>
-            <a:ext cx="4267200" cy="3200400"/>
+            <a:off x="457200" y="1371600"/>
+            <a:ext cx="3657600" cy="2743200"/>
           </a:xfrm>
           <a:prstGeom prst="rect">
             <a:avLst/>
@@ -3702,7 +3774,7 @@
       </p:pic>
       <p:pic>
         <p:nvPicPr>
-          <p:cNvPr id="4" name="Picture 3" descr="DECK_Total_Expenses.png"/>
+          <p:cNvPr id="4" name="Picture 3" descr="PANW_Gross_Profit.png"/>
           <p:cNvPicPr>
             <a:picLocks noChangeAspect="1"/>
           </p:cNvPicPr>
@@ -3716,8 +3788,8 @@
         </p:blipFill>
         <p:spPr>
           <a:xfrm>
-            <a:off x="5029200" y="1371600"/>
-            <a:ext cx="4267200" cy="3200400"/>
+            <a:off x="4572000" y="1371600"/>
+            <a:ext cx="3657600" cy="2743200"/>
           </a:xfrm>
           <a:prstGeom prst="rect">
             <a:avLst/>
@@ -3726,7 +3798,7 @@
       </p:pic>
       <p:pic>
         <p:nvPicPr>
-          <p:cNvPr id="5" name="Picture 4" descr="ADDYY_Total_Expenses.png"/>
+          <p:cNvPr id="5" name="Picture 4" descr="ZS_Gross_Profit.png"/>
           <p:cNvPicPr>
             <a:picLocks noChangeAspect="1"/>
           </p:cNvPicPr>
@@ -3740,8 +3812,32 @@
         </p:blipFill>
         <p:spPr>
           <a:xfrm>
-            <a:off x="914400" y="5029200"/>
-            <a:ext cx="4267200" cy="3200400"/>
+            <a:off x="457200" y="4114800"/>
+            <a:ext cx="3657600" cy="2743200"/>
+          </a:xfrm>
+          <a:prstGeom prst="rect">
+            <a:avLst/>
+          </a:prstGeom>
+        </p:spPr>
+      </p:pic>
+      <p:pic>
+        <p:nvPicPr>
+          <p:cNvPr id="6" name="Picture 5" descr="S_Gross_Profit.png"/>
+          <p:cNvPicPr>
+            <a:picLocks noChangeAspect="1"/>
+          </p:cNvPicPr>
+          <p:nvPr/>
+        </p:nvPicPr>
+        <p:blipFill>
+          <a:blip r:embed="rId5"/>
+          <a:stretch>
+            <a:fillRect/>
+          </a:stretch>
+        </p:blipFill>
+        <p:spPr>
+          <a:xfrm>
+            <a:off x="4572000" y="4114800"/>
+            <a:ext cx="3657600" cy="2743200"/>
           </a:xfrm>
           <a:prstGeom prst="rect">
             <a:avLst/>
@@ -3782,14 +3878,14 @@
           <a:lstStyle/>
           <a:p>
             <a:r>
-              <a:t>Total Revenue.png</a:t>
+              <a:t>Basic EPS.png</a:t>
             </a:r>
           </a:p>
         </p:txBody>
       </p:sp>
       <p:pic>
         <p:nvPicPr>
-          <p:cNvPr id="3" name="Picture 2" descr="NKE_Total_Revenue.png"/>
+          <p:cNvPr id="3" name="Picture 2" descr="PANW_Basic_EPS.png"/>
           <p:cNvPicPr>
             <a:picLocks noChangeAspect="1"/>
           </p:cNvPicPr>
@@ -3803,8 +3899,8 @@
         </p:blipFill>
         <p:spPr>
           <a:xfrm>
-            <a:off x="914400" y="1371600"/>
-            <a:ext cx="4267200" cy="3200400"/>
+            <a:off x="457200" y="1371600"/>
+            <a:ext cx="3657600" cy="2743200"/>
           </a:xfrm>
           <a:prstGeom prst="rect">
             <a:avLst/>
@@ -3813,7 +3909,7 @@
       </p:pic>
       <p:pic>
         <p:nvPicPr>
-          <p:cNvPr id="4" name="Picture 3" descr="ADDYY_Total_Revenue.png"/>
+          <p:cNvPr id="4" name="Picture 3" descr="ZS_Basic_EPS.png"/>
           <p:cNvPicPr>
             <a:picLocks noChangeAspect="1"/>
           </p:cNvPicPr>
@@ -3827,8 +3923,8 @@
         </p:blipFill>
         <p:spPr>
           <a:xfrm>
-            <a:off x="5029200" y="1371600"/>
-            <a:ext cx="4267200" cy="3200400"/>
+            <a:off x="4572000" y="1371600"/>
+            <a:ext cx="3657600" cy="2743200"/>
           </a:xfrm>
           <a:prstGeom prst="rect">
             <a:avLst/>
@@ -3837,7 +3933,7 @@
       </p:pic>
       <p:pic>
         <p:nvPicPr>
-          <p:cNvPr id="5" name="Picture 4" descr="DECK_Total_Revenue.png"/>
+          <p:cNvPr id="5" name="Picture 4" descr="S_Basic_EPS.png"/>
           <p:cNvPicPr>
             <a:picLocks noChangeAspect="1"/>
           </p:cNvPicPr>
@@ -3851,8 +3947,32 @@
         </p:blipFill>
         <p:spPr>
           <a:xfrm>
-            <a:off x="914400" y="5029200"/>
-            <a:ext cx="4267200" cy="3200400"/>
+            <a:off x="457200" y="4114800"/>
+            <a:ext cx="3657600" cy="2743200"/>
+          </a:xfrm>
+          <a:prstGeom prst="rect">
+            <a:avLst/>
+          </a:prstGeom>
+        </p:spPr>
+      </p:pic>
+      <p:pic>
+        <p:nvPicPr>
+          <p:cNvPr id="6" name="Picture 5" descr="CRWD_Basic_EPS.png"/>
+          <p:cNvPicPr>
+            <a:picLocks noChangeAspect="1"/>
+          </p:cNvPicPr>
+          <p:nvPr/>
+        </p:nvPicPr>
+        <p:blipFill>
+          <a:blip r:embed="rId5"/>
+          <a:stretch>
+            <a:fillRect/>
+          </a:stretch>
+        </p:blipFill>
+        <p:spPr>
+          <a:xfrm>
+            <a:off x="4572000" y="4114800"/>
+            <a:ext cx="3657600" cy="2743200"/>
           </a:xfrm>
           <a:prstGeom prst="rect">
             <a:avLst/>
@@ -3893,14 +4013,14 @@
           <a:lstStyle/>
           <a:p>
             <a:r>
-              <a:t>Cost of Revenue.png</a:t>
+              <a:t>Total Revenue.png</a:t>
             </a:r>
           </a:p>
         </p:txBody>
       </p:sp>
       <p:pic>
         <p:nvPicPr>
-          <p:cNvPr id="3" name="Picture 2" descr="NKE_Cost_of_Revenue.png"/>
+          <p:cNvPr id="3" name="Picture 2" descr="ZS_Total_Revenue.png"/>
           <p:cNvPicPr>
             <a:picLocks noChangeAspect="1"/>
           </p:cNvPicPr>
@@ -3914,8 +4034,8 @@
         </p:blipFill>
         <p:spPr>
           <a:xfrm>
-            <a:off x="914400" y="1371600"/>
-            <a:ext cx="4267200" cy="3200400"/>
+            <a:off x="457200" y="1371600"/>
+            <a:ext cx="3657600" cy="2743200"/>
           </a:xfrm>
           <a:prstGeom prst="rect">
             <a:avLst/>
@@ -3924,7 +4044,7 @@
       </p:pic>
       <p:pic>
         <p:nvPicPr>
-          <p:cNvPr id="4" name="Picture 3" descr="ADDYY_Cost_of_Revenue.png"/>
+          <p:cNvPr id="4" name="Picture 3" descr="S_Total_Revenue.png"/>
           <p:cNvPicPr>
             <a:picLocks noChangeAspect="1"/>
           </p:cNvPicPr>
@@ -3938,8 +4058,8 @@
         </p:blipFill>
         <p:spPr>
           <a:xfrm>
-            <a:off x="5029200" y="1371600"/>
-            <a:ext cx="4267200" cy="3200400"/>
+            <a:off x="4572000" y="1371600"/>
+            <a:ext cx="3657600" cy="2743200"/>
           </a:xfrm>
           <a:prstGeom prst="rect">
             <a:avLst/>
@@ -3948,7 +4068,7 @@
       </p:pic>
       <p:pic>
         <p:nvPicPr>
-          <p:cNvPr id="5" name="Picture 4" descr="DECK_Cost_of_Revenue.png"/>
+          <p:cNvPr id="5" name="Picture 4" descr="CRWD_Total_Revenue.png"/>
           <p:cNvPicPr>
             <a:picLocks noChangeAspect="1"/>
           </p:cNvPicPr>
@@ -3962,8 +4082,32 @@
         </p:blipFill>
         <p:spPr>
           <a:xfrm>
-            <a:off x="914400" y="5029200"/>
-            <a:ext cx="4267200" cy="3200400"/>
+            <a:off x="457200" y="4114800"/>
+            <a:ext cx="3657600" cy="2743200"/>
+          </a:xfrm>
+          <a:prstGeom prst="rect">
+            <a:avLst/>
+          </a:prstGeom>
+        </p:spPr>
+      </p:pic>
+      <p:pic>
+        <p:nvPicPr>
+          <p:cNvPr id="6" name="Picture 5" descr="PANW_Total_Revenue.png"/>
+          <p:cNvPicPr>
+            <a:picLocks noChangeAspect="1"/>
+          </p:cNvPicPr>
+          <p:nvPr/>
+        </p:nvPicPr>
+        <p:blipFill>
+          <a:blip r:embed="rId5"/>
+          <a:stretch>
+            <a:fillRect/>
+          </a:stretch>
+        </p:blipFill>
+        <p:spPr>
+          <a:xfrm>
+            <a:off x="4572000" y="4114800"/>
+            <a:ext cx="3657600" cy="2743200"/>
           </a:xfrm>
           <a:prstGeom prst="rect">
             <a:avLst/>
@@ -4011,7 +4155,7 @@
       </p:sp>
       <p:pic>
         <p:nvPicPr>
-          <p:cNvPr id="3" name="Picture 2" descr="ADDYY_Net_Income_Common_Stockholders.png"/>
+          <p:cNvPr id="3" name="Picture 2" descr="CRWD_Net_Income_Common_Stockholders.png"/>
           <p:cNvPicPr>
             <a:picLocks noChangeAspect="1"/>
           </p:cNvPicPr>
@@ -4025,8 +4169,8 @@
         </p:blipFill>
         <p:spPr>
           <a:xfrm>
-            <a:off x="914400" y="1371600"/>
-            <a:ext cx="4267200" cy="3200400"/>
+            <a:off x="457200" y="1371600"/>
+            <a:ext cx="3657600" cy="2743200"/>
           </a:xfrm>
           <a:prstGeom prst="rect">
             <a:avLst/>
@@ -4035,7 +4179,7 @@
       </p:pic>
       <p:pic>
         <p:nvPicPr>
-          <p:cNvPr id="4" name="Picture 3" descr="NKE_Net_Income_Common_Stockholders.png"/>
+          <p:cNvPr id="4" name="Picture 3" descr="ZS_Net_Income_Common_Stockholders.png"/>
           <p:cNvPicPr>
             <a:picLocks noChangeAspect="1"/>
           </p:cNvPicPr>
@@ -4049,8 +4193,8 @@
         </p:blipFill>
         <p:spPr>
           <a:xfrm>
-            <a:off x="5029200" y="1371600"/>
-            <a:ext cx="4267200" cy="3200400"/>
+            <a:off x="4572000" y="1371600"/>
+            <a:ext cx="3657600" cy="2743200"/>
           </a:xfrm>
           <a:prstGeom prst="rect">
             <a:avLst/>
@@ -4059,7 +4203,7 @@
       </p:pic>
       <p:pic>
         <p:nvPicPr>
-          <p:cNvPr id="5" name="Picture 4" descr="DECK_Net_Income_Common_Stockholders.png"/>
+          <p:cNvPr id="5" name="Picture 4" descr="PANW_Net_Income_Common_Stockholders.png"/>
           <p:cNvPicPr>
             <a:picLocks noChangeAspect="1"/>
           </p:cNvPicPr>
@@ -4073,8 +4217,32 @@
         </p:blipFill>
         <p:spPr>
           <a:xfrm>
-            <a:off x="914400" y="5029200"/>
-            <a:ext cx="4267200" cy="3200400"/>
+            <a:off x="457200" y="4114800"/>
+            <a:ext cx="3657600" cy="2743200"/>
+          </a:xfrm>
+          <a:prstGeom prst="rect">
+            <a:avLst/>
+          </a:prstGeom>
+        </p:spPr>
+      </p:pic>
+      <p:pic>
+        <p:nvPicPr>
+          <p:cNvPr id="6" name="Picture 5" descr="S_Net_Income_Common_Stockholders.png"/>
+          <p:cNvPicPr>
+            <a:picLocks noChangeAspect="1"/>
+          </p:cNvPicPr>
+          <p:nvPr/>
+        </p:nvPicPr>
+        <p:blipFill>
+          <a:blip r:embed="rId5"/>
+          <a:stretch>
+            <a:fillRect/>
+          </a:stretch>
+        </p:blipFill>
+        <p:spPr>
+          <a:xfrm>
+            <a:off x="4572000" y="4114800"/>
+            <a:ext cx="3657600" cy="2743200"/>
           </a:xfrm>
           <a:prstGeom prst="rect">
             <a:avLst/>
@@ -4115,14 +4283,14 @@
           <a:lstStyle/>
           <a:p>
             <a:r>
-              <a:t>Basic EPS.png</a:t>
+              <a:t>Basic Average Shares.png</a:t>
             </a:r>
           </a:p>
         </p:txBody>
       </p:sp>
       <p:pic>
         <p:nvPicPr>
-          <p:cNvPr id="3" name="Picture 2" descr="NKE_Basic_EPS.png"/>
+          <p:cNvPr id="3" name="Picture 2" descr="PANW_Basic_Average_Shares.png"/>
           <p:cNvPicPr>
             <a:picLocks noChangeAspect="1"/>
           </p:cNvPicPr>
@@ -4136,8 +4304,8 @@
         </p:blipFill>
         <p:spPr>
           <a:xfrm>
-            <a:off x="914400" y="1371600"/>
-            <a:ext cx="4267200" cy="3200400"/>
+            <a:off x="457200" y="1371600"/>
+            <a:ext cx="3657600" cy="2743200"/>
           </a:xfrm>
           <a:prstGeom prst="rect">
             <a:avLst/>
@@ -4146,7 +4314,7 @@
       </p:pic>
       <p:pic>
         <p:nvPicPr>
-          <p:cNvPr id="4" name="Picture 3" descr="DECK_Basic_EPS.png"/>
+          <p:cNvPr id="4" name="Picture 3" descr="CRWD_Basic_Average_Shares.png"/>
           <p:cNvPicPr>
             <a:picLocks noChangeAspect="1"/>
           </p:cNvPicPr>
@@ -4160,8 +4328,8 @@
         </p:blipFill>
         <p:spPr>
           <a:xfrm>
-            <a:off x="5029200" y="1371600"/>
-            <a:ext cx="4267200" cy="3200400"/>
+            <a:off x="4572000" y="1371600"/>
+            <a:ext cx="3657600" cy="2743200"/>
           </a:xfrm>
           <a:prstGeom prst="rect">
             <a:avLst/>
@@ -4170,7 +4338,7 @@
       </p:pic>
       <p:pic>
         <p:nvPicPr>
-          <p:cNvPr id="5" name="Picture 4" descr="ADDYY_Basic_EPS.png"/>
+          <p:cNvPr id="5" name="Picture 4" descr="ZS_Basic_Average_Shares.png"/>
           <p:cNvPicPr>
             <a:picLocks noChangeAspect="1"/>
           </p:cNvPicPr>
@@ -4184,8 +4352,32 @@
         </p:blipFill>
         <p:spPr>
           <a:xfrm>
-            <a:off x="914400" y="5029200"/>
-            <a:ext cx="4267200" cy="3200400"/>
+            <a:off x="457200" y="4114800"/>
+            <a:ext cx="3657600" cy="2743200"/>
+          </a:xfrm>
+          <a:prstGeom prst="rect">
+            <a:avLst/>
+          </a:prstGeom>
+        </p:spPr>
+      </p:pic>
+      <p:pic>
+        <p:nvPicPr>
+          <p:cNvPr id="6" name="Picture 5" descr="S_Basic_Average_Shares.png"/>
+          <p:cNvPicPr>
+            <a:picLocks noChangeAspect="1"/>
+          </p:cNvPicPr>
+          <p:nvPr/>
+        </p:nvPicPr>
+        <p:blipFill>
+          <a:blip r:embed="rId5"/>
+          <a:stretch>
+            <a:fillRect/>
+          </a:stretch>
+        </p:blipFill>
+        <p:spPr>
+          <a:xfrm>
+            <a:off x="4572000" y="4114800"/>
+            <a:ext cx="3657600" cy="2743200"/>
           </a:xfrm>
           <a:prstGeom prst="rect">
             <a:avLst/>
@@ -4226,14 +4418,14 @@
           <a:lstStyle/>
           <a:p>
             <a:r>
-              <a:t>Gross Profit.png</a:t>
+              <a:t>Total Expenses.png</a:t>
             </a:r>
           </a:p>
         </p:txBody>
       </p:sp>
       <p:pic>
         <p:nvPicPr>
-          <p:cNvPr id="3" name="Picture 2" descr="DECK_Gross_Profit.png"/>
+          <p:cNvPr id="3" name="Picture 2" descr="S_Total_Expenses.png"/>
           <p:cNvPicPr>
             <a:picLocks noChangeAspect="1"/>
           </p:cNvPicPr>
@@ -4247,8 +4439,8 @@
         </p:blipFill>
         <p:spPr>
           <a:xfrm>
-            <a:off x="914400" y="1371600"/>
-            <a:ext cx="4267200" cy="3200400"/>
+            <a:off x="457200" y="1371600"/>
+            <a:ext cx="3657600" cy="2743200"/>
           </a:xfrm>
           <a:prstGeom prst="rect">
             <a:avLst/>
@@ -4257,7 +4449,7 @@
       </p:pic>
       <p:pic>
         <p:nvPicPr>
-          <p:cNvPr id="4" name="Picture 3" descr="NKE_Gross_Profit.png"/>
+          <p:cNvPr id="4" name="Picture 3" descr="PANW_Total_Expenses.png"/>
           <p:cNvPicPr>
             <a:picLocks noChangeAspect="1"/>
           </p:cNvPicPr>
@@ -4271,8 +4463,8 @@
         </p:blipFill>
         <p:spPr>
           <a:xfrm>
-            <a:off x="5029200" y="1371600"/>
-            <a:ext cx="4267200" cy="3200400"/>
+            <a:off x="4572000" y="1371600"/>
+            <a:ext cx="3657600" cy="2743200"/>
           </a:xfrm>
           <a:prstGeom prst="rect">
             <a:avLst/>
@@ -4281,7 +4473,7 @@
       </p:pic>
       <p:pic>
         <p:nvPicPr>
-          <p:cNvPr id="5" name="Picture 4" descr="ADDYY_Gross_Profit.png"/>
+          <p:cNvPr id="5" name="Picture 4" descr="ZS_Total_Expenses.png"/>
           <p:cNvPicPr>
             <a:picLocks noChangeAspect="1"/>
           </p:cNvPicPr>
@@ -4295,8 +4487,32 @@
         </p:blipFill>
         <p:spPr>
           <a:xfrm>
-            <a:off x="914400" y="5029200"/>
-            <a:ext cx="4267200" cy="3200400"/>
+            <a:off x="457200" y="4114800"/>
+            <a:ext cx="3657600" cy="2743200"/>
+          </a:xfrm>
+          <a:prstGeom prst="rect">
+            <a:avLst/>
+          </a:prstGeom>
+        </p:spPr>
+      </p:pic>
+      <p:pic>
+        <p:nvPicPr>
+          <p:cNvPr id="6" name="Picture 5" descr="CRWD_Total_Expenses.png"/>
+          <p:cNvPicPr>
+            <a:picLocks noChangeAspect="1"/>
+          </p:cNvPicPr>
+          <p:nvPr/>
+        </p:nvPicPr>
+        <p:blipFill>
+          <a:blip r:embed="rId5"/>
+          <a:stretch>
+            <a:fillRect/>
+          </a:stretch>
+        </p:blipFill>
+        <p:spPr>
+          <a:xfrm>
+            <a:off x="4572000" y="4114800"/>
+            <a:ext cx="3657600" cy="2743200"/>
           </a:xfrm>
           <a:prstGeom prst="rect">
             <a:avLst/>
@@ -4337,14 +4553,14 @@
           <a:lstStyle/>
           <a:p>
             <a:r>
-              <a:t>Total Capitalization.png</a:t>
+              <a:t>Ordinary Shares Number.png</a:t>
             </a:r>
           </a:p>
         </p:txBody>
       </p:sp>
       <p:pic>
         <p:nvPicPr>
-          <p:cNvPr id="3" name="Picture 2" descr="NKE_Total_Capitalization.png"/>
+          <p:cNvPr id="3" name="Picture 2" descr="CRWD_Ordinary_Shares_Number.png"/>
           <p:cNvPicPr>
             <a:picLocks noChangeAspect="1"/>
           </p:cNvPicPr>
@@ -4358,8 +4574,8 @@
         </p:blipFill>
         <p:spPr>
           <a:xfrm>
-            <a:off x="914400" y="1371600"/>
-            <a:ext cx="4267200" cy="3200400"/>
+            <a:off x="457200" y="1371600"/>
+            <a:ext cx="3657600" cy="2743200"/>
           </a:xfrm>
           <a:prstGeom prst="rect">
             <a:avLst/>
@@ -4368,7 +4584,7 @@
       </p:pic>
       <p:pic>
         <p:nvPicPr>
-          <p:cNvPr id="4" name="Picture 3" descr="DECK_Total_Capitalization.png"/>
+          <p:cNvPr id="4" name="Picture 3" descr="PANW_Ordinary_Shares_Number.png"/>
           <p:cNvPicPr>
             <a:picLocks noChangeAspect="1"/>
           </p:cNvPicPr>
@@ -4382,8 +4598,8 @@
         </p:blipFill>
         <p:spPr>
           <a:xfrm>
-            <a:off x="5029200" y="1371600"/>
-            <a:ext cx="4267200" cy="3200400"/>
+            <a:off x="4572000" y="1371600"/>
+            <a:ext cx="3657600" cy="2743200"/>
           </a:xfrm>
           <a:prstGeom prst="rect">
             <a:avLst/>
@@ -4392,7 +4608,7 @@
       </p:pic>
       <p:pic>
         <p:nvPicPr>
-          <p:cNvPr id="5" name="Picture 4" descr="ADDYY_Total_Capitalization.png"/>
+          <p:cNvPr id="5" name="Picture 4" descr="S_Ordinary_Shares_Number.png"/>
           <p:cNvPicPr>
             <a:picLocks noChangeAspect="1"/>
           </p:cNvPicPr>
@@ -4406,8 +4622,32 @@
         </p:blipFill>
         <p:spPr>
           <a:xfrm>
-            <a:off x="914400" y="5029200"/>
-            <a:ext cx="4267200" cy="3200400"/>
+            <a:off x="457200" y="4114800"/>
+            <a:ext cx="3657600" cy="2743200"/>
+          </a:xfrm>
+          <a:prstGeom prst="rect">
+            <a:avLst/>
+          </a:prstGeom>
+        </p:spPr>
+      </p:pic>
+      <p:pic>
+        <p:nvPicPr>
+          <p:cNvPr id="6" name="Picture 5" descr="ZS_Ordinary_Shares_Number.png"/>
+          <p:cNvPicPr>
+            <a:picLocks noChangeAspect="1"/>
+          </p:cNvPicPr>
+          <p:nvPr/>
+        </p:nvPicPr>
+        <p:blipFill>
+          <a:blip r:embed="rId5"/>
+          <a:stretch>
+            <a:fillRect/>
+          </a:stretch>
+        </p:blipFill>
+        <p:spPr>
+          <a:xfrm>
+            <a:off x="4572000" y="4114800"/>
+            <a:ext cx="3657600" cy="2743200"/>
           </a:xfrm>
           <a:prstGeom prst="rect">
             <a:avLst/>
@@ -4448,14 +4688,14 @@
           <a:lstStyle/>
           <a:p>
             <a:r>
-              <a:t>Ordinary Shares Number.png</a:t>
+              <a:t>Total Capitalization.png</a:t>
             </a:r>
           </a:p>
         </p:txBody>
       </p:sp>
       <p:pic>
         <p:nvPicPr>
-          <p:cNvPr id="3" name="Picture 2" descr="DECK_Ordinary_Shares_Number.png"/>
+          <p:cNvPr id="3" name="Picture 2" descr="PANW_Total_Capitalization.png"/>
           <p:cNvPicPr>
             <a:picLocks noChangeAspect="1"/>
           </p:cNvPicPr>
@@ -4469,8 +4709,8 @@
         </p:blipFill>
         <p:spPr>
           <a:xfrm>
-            <a:off x="914400" y="1371600"/>
-            <a:ext cx="4267200" cy="3200400"/>
+            <a:off x="457200" y="1371600"/>
+            <a:ext cx="3657600" cy="2743200"/>
           </a:xfrm>
           <a:prstGeom prst="rect">
             <a:avLst/>
@@ -4479,7 +4719,7 @@
       </p:pic>
       <p:pic>
         <p:nvPicPr>
-          <p:cNvPr id="4" name="Picture 3" descr="NKE_Ordinary_Shares_Number.png"/>
+          <p:cNvPr id="4" name="Picture 3" descr="CRWD_Total_Capitalization.png"/>
           <p:cNvPicPr>
             <a:picLocks noChangeAspect="1"/>
           </p:cNvPicPr>
@@ -4493,8 +4733,8 @@
         </p:blipFill>
         <p:spPr>
           <a:xfrm>
-            <a:off x="5029200" y="1371600"/>
-            <a:ext cx="4267200" cy="3200400"/>
+            <a:off x="4572000" y="1371600"/>
+            <a:ext cx="3657600" cy="2743200"/>
           </a:xfrm>
           <a:prstGeom prst="rect">
             <a:avLst/>
@@ -4503,7 +4743,7 @@
       </p:pic>
       <p:pic>
         <p:nvPicPr>
-          <p:cNvPr id="5" name="Picture 4" descr="ADDYY_Ordinary_Shares_Number.png"/>
+          <p:cNvPr id="5" name="Picture 4" descr="ZS_Total_Capitalization.png"/>
           <p:cNvPicPr>
             <a:picLocks noChangeAspect="1"/>
           </p:cNvPicPr>
@@ -4517,8 +4757,32 @@
         </p:blipFill>
         <p:spPr>
           <a:xfrm>
-            <a:off x="914400" y="5029200"/>
-            <a:ext cx="4267200" cy="3200400"/>
+            <a:off x="457200" y="4114800"/>
+            <a:ext cx="3657600" cy="2743200"/>
+          </a:xfrm>
+          <a:prstGeom prst="rect">
+            <a:avLst/>
+          </a:prstGeom>
+        </p:spPr>
+      </p:pic>
+      <p:pic>
+        <p:nvPicPr>
+          <p:cNvPr id="6" name="Picture 5" descr="S_Total_Capitalization.png"/>
+          <p:cNvPicPr>
+            <a:picLocks noChangeAspect="1"/>
+          </p:cNvPicPr>
+          <p:nvPr/>
+        </p:nvPicPr>
+        <p:blipFill>
+          <a:blip r:embed="rId5"/>
+          <a:stretch>
+            <a:fillRect/>
+          </a:stretch>
+        </p:blipFill>
+        <p:spPr>
+          <a:xfrm>
+            <a:off x="4572000" y="4114800"/>
+            <a:ext cx="3657600" cy="2743200"/>
           </a:xfrm>
           <a:prstGeom prst="rect">
             <a:avLst/>

</xml_diff>

<commit_message>
Researching OXY as berkshire indirectly has been buying large quantities in the last 3 months
</commit_message>
<xml_diff>
--- a/Combined_Plots_Presentation.pptx
+++ b/Combined_Plots_Presentation.pptx
@@ -3116,14 +3116,14 @@
           <a:lstStyle/>
           <a:p>
             <a:r>
-              <a:t>Cost of Revenue.png</a:t>
+              <a:t>Basic Average Shares.png</a:t>
             </a:r>
           </a:p>
         </p:txBody>
       </p:sp>
       <p:pic>
         <p:nvPicPr>
-          <p:cNvPr id="3" name="Picture 2" descr="ZS_Cost_of_Revenue.png"/>
+          <p:cNvPr id="3" name="Picture 2" descr="OXY_Basic_Average_Shares.png"/>
           <p:cNvPicPr>
             <a:picLocks noChangeAspect="1"/>
           </p:cNvPicPr>
@@ -3147,7 +3147,7 @@
       </p:pic>
       <p:pic>
         <p:nvPicPr>
-          <p:cNvPr id="4" name="Picture 3" descr="S_Cost_of_Revenue.png"/>
+          <p:cNvPr id="4" name="Picture 3" descr="XOM_Basic_Average_Shares.png"/>
           <p:cNvPicPr>
             <a:picLocks noChangeAspect="1"/>
           </p:cNvPicPr>
@@ -3171,7 +3171,7 @@
       </p:pic>
       <p:pic>
         <p:nvPicPr>
-          <p:cNvPr id="5" name="Picture 4" descr="CRWD_Cost_of_Revenue.png"/>
+          <p:cNvPr id="5" name="Picture 4" descr="CVX_Basic_Average_Shares.png"/>
           <p:cNvPicPr>
             <a:picLocks noChangeAspect="1"/>
           </p:cNvPicPr>
@@ -3186,30 +3186,6 @@
         <p:spPr>
           <a:xfrm>
             <a:off x="457200" y="4114800"/>
-            <a:ext cx="3657600" cy="2743200"/>
-          </a:xfrm>
-          <a:prstGeom prst="rect">
-            <a:avLst/>
-          </a:prstGeom>
-        </p:spPr>
-      </p:pic>
-      <p:pic>
-        <p:nvPicPr>
-          <p:cNvPr id="6" name="Picture 5" descr="PANW_Cost_of_Revenue.png"/>
-          <p:cNvPicPr>
-            <a:picLocks noChangeAspect="1"/>
-          </p:cNvPicPr>
-          <p:nvPr/>
-        </p:nvPicPr>
-        <p:blipFill>
-          <a:blip r:embed="rId5"/>
-          <a:stretch>
-            <a:fillRect/>
-          </a:stretch>
-        </p:blipFill>
-        <p:spPr>
-          <a:xfrm>
-            <a:off x="4572000" y="4114800"/>
             <a:ext cx="3657600" cy="2743200"/>
           </a:xfrm>
           <a:prstGeom prst="rect">
@@ -3251,14 +3227,14 @@
           <a:lstStyle/>
           <a:p>
             <a:r>
-              <a:t>Total Debt.png</a:t>
+              <a:t>Ordinary Shares Number.png</a:t>
             </a:r>
           </a:p>
         </p:txBody>
       </p:sp>
       <p:pic>
         <p:nvPicPr>
-          <p:cNvPr id="3" name="Picture 2" descr="S_Total_Debt.png"/>
+          <p:cNvPr id="3" name="Picture 2" descr="CVX_Ordinary_Shares_Number.png"/>
           <p:cNvPicPr>
             <a:picLocks noChangeAspect="1"/>
           </p:cNvPicPr>
@@ -3273,78 +3249,6 @@
         <p:spPr>
           <a:xfrm>
             <a:off x="457200" y="1371600"/>
-            <a:ext cx="3657600" cy="2743200"/>
-          </a:xfrm>
-          <a:prstGeom prst="rect">
-            <a:avLst/>
-          </a:prstGeom>
-        </p:spPr>
-      </p:pic>
-      <p:pic>
-        <p:nvPicPr>
-          <p:cNvPr id="4" name="Picture 3" descr="ZS_Total_Debt.png"/>
-          <p:cNvPicPr>
-            <a:picLocks noChangeAspect="1"/>
-          </p:cNvPicPr>
-          <p:nvPr/>
-        </p:nvPicPr>
-        <p:blipFill>
-          <a:blip r:embed="rId3"/>
-          <a:stretch>
-            <a:fillRect/>
-          </a:stretch>
-        </p:blipFill>
-        <p:spPr>
-          <a:xfrm>
-            <a:off x="4572000" y="1371600"/>
-            <a:ext cx="3657600" cy="2743200"/>
-          </a:xfrm>
-          <a:prstGeom prst="rect">
-            <a:avLst/>
-          </a:prstGeom>
-        </p:spPr>
-      </p:pic>
-      <p:pic>
-        <p:nvPicPr>
-          <p:cNvPr id="5" name="Picture 4" descr="PANW_Total_Debt.png"/>
-          <p:cNvPicPr>
-            <a:picLocks noChangeAspect="1"/>
-          </p:cNvPicPr>
-          <p:nvPr/>
-        </p:nvPicPr>
-        <p:blipFill>
-          <a:blip r:embed="rId4"/>
-          <a:stretch>
-            <a:fillRect/>
-          </a:stretch>
-        </p:blipFill>
-        <p:spPr>
-          <a:xfrm>
-            <a:off x="457200" y="4114800"/>
-            <a:ext cx="3657600" cy="2743200"/>
-          </a:xfrm>
-          <a:prstGeom prst="rect">
-            <a:avLst/>
-          </a:prstGeom>
-        </p:spPr>
-      </p:pic>
-      <p:pic>
-        <p:nvPicPr>
-          <p:cNvPr id="6" name="Picture 5" descr="CRWD_Total_Debt.png"/>
-          <p:cNvPicPr>
-            <a:picLocks noChangeAspect="1"/>
-          </p:cNvPicPr>
-          <p:nvPr/>
-        </p:nvPicPr>
-        <p:blipFill>
-          <a:blip r:embed="rId5"/>
-          <a:stretch>
-            <a:fillRect/>
-          </a:stretch>
-        </p:blipFill>
-        <p:spPr>
-          <a:xfrm>
-            <a:off x="4572000" y="4114800"/>
             <a:ext cx="3657600" cy="2743200"/>
           </a:xfrm>
           <a:prstGeom prst="rect">
@@ -3386,14 +3290,14 @@
           <a:lstStyle/>
           <a:p>
             <a:r>
-              <a:t>Total Assets.png</a:t>
+              <a:t>Total Capitalization.png</a:t>
             </a:r>
           </a:p>
         </p:txBody>
       </p:sp>
       <p:pic>
         <p:nvPicPr>
-          <p:cNvPr id="3" name="Picture 2" descr="S_Total_Assets.png"/>
+          <p:cNvPr id="3" name="Picture 2" descr="CVX_Total_Capitalization.png"/>
           <p:cNvPicPr>
             <a:picLocks noChangeAspect="1"/>
           </p:cNvPicPr>
@@ -3408,78 +3312,6 @@
         <p:spPr>
           <a:xfrm>
             <a:off x="457200" y="1371600"/>
-            <a:ext cx="3657600" cy="2743200"/>
-          </a:xfrm>
-          <a:prstGeom prst="rect">
-            <a:avLst/>
-          </a:prstGeom>
-        </p:spPr>
-      </p:pic>
-      <p:pic>
-        <p:nvPicPr>
-          <p:cNvPr id="4" name="Picture 3" descr="ZS_Total_Assets.png"/>
-          <p:cNvPicPr>
-            <a:picLocks noChangeAspect="1"/>
-          </p:cNvPicPr>
-          <p:nvPr/>
-        </p:nvPicPr>
-        <p:blipFill>
-          <a:blip r:embed="rId3"/>
-          <a:stretch>
-            <a:fillRect/>
-          </a:stretch>
-        </p:blipFill>
-        <p:spPr>
-          <a:xfrm>
-            <a:off x="4572000" y="1371600"/>
-            <a:ext cx="3657600" cy="2743200"/>
-          </a:xfrm>
-          <a:prstGeom prst="rect">
-            <a:avLst/>
-          </a:prstGeom>
-        </p:spPr>
-      </p:pic>
-      <p:pic>
-        <p:nvPicPr>
-          <p:cNvPr id="5" name="Picture 4" descr="CRWD_Total_Assets.png"/>
-          <p:cNvPicPr>
-            <a:picLocks noChangeAspect="1"/>
-          </p:cNvPicPr>
-          <p:nvPr/>
-        </p:nvPicPr>
-        <p:blipFill>
-          <a:blip r:embed="rId4"/>
-          <a:stretch>
-            <a:fillRect/>
-          </a:stretch>
-        </p:blipFill>
-        <p:spPr>
-          <a:xfrm>
-            <a:off x="457200" y="4114800"/>
-            <a:ext cx="3657600" cy="2743200"/>
-          </a:xfrm>
-          <a:prstGeom prst="rect">
-            <a:avLst/>
-          </a:prstGeom>
-        </p:spPr>
-      </p:pic>
-      <p:pic>
-        <p:nvPicPr>
-          <p:cNvPr id="6" name="Picture 5" descr="PANW_Total_Assets.png"/>
-          <p:cNvPicPr>
-            <a:picLocks noChangeAspect="1"/>
-          </p:cNvPicPr>
-          <p:nvPr/>
-        </p:nvPicPr>
-        <p:blipFill>
-          <a:blip r:embed="rId5"/>
-          <a:stretch>
-            <a:fillRect/>
-          </a:stretch>
-        </p:blipFill>
-        <p:spPr>
-          <a:xfrm>
-            <a:off x="4572000" y="4114800"/>
             <a:ext cx="3657600" cy="2743200"/>
           </a:xfrm>
           <a:prstGeom prst="rect">
@@ -3528,7 +3360,7 @@
       </p:sp>
       <p:pic>
         <p:nvPicPr>
-          <p:cNvPr id="3" name="Picture 2" descr="PANW_Free_Cash_Flow.png"/>
+          <p:cNvPr id="3" name="Picture 2" descr="XOM_Free_Cash_Flow.png"/>
           <p:cNvPicPr>
             <a:picLocks noChangeAspect="1"/>
           </p:cNvPicPr>
@@ -3552,7 +3384,7 @@
       </p:pic>
       <p:pic>
         <p:nvPicPr>
-          <p:cNvPr id="4" name="Picture 3" descr="CRWD_Free_Cash_Flow.png"/>
+          <p:cNvPr id="4" name="Picture 3" descr="OXY_Free_Cash_Flow.png"/>
           <p:cNvPicPr>
             <a:picLocks noChangeAspect="1"/>
           </p:cNvPicPr>
@@ -3576,7 +3408,7 @@
       </p:pic>
       <p:pic>
         <p:nvPicPr>
-          <p:cNvPr id="5" name="Picture 4" descr="ZS_Free_Cash_Flow.png"/>
+          <p:cNvPr id="5" name="Picture 4" descr="CVX_Free_Cash_Flow.png"/>
           <p:cNvPicPr>
             <a:picLocks noChangeAspect="1"/>
           </p:cNvPicPr>
@@ -3591,30 +3423,6 @@
         <p:spPr>
           <a:xfrm>
             <a:off x="457200" y="4114800"/>
-            <a:ext cx="3657600" cy="2743200"/>
-          </a:xfrm>
-          <a:prstGeom prst="rect">
-            <a:avLst/>
-          </a:prstGeom>
-        </p:spPr>
-      </p:pic>
-      <p:pic>
-        <p:nvPicPr>
-          <p:cNvPr id="6" name="Picture 5" descr="S_Free_Cash_Flow.png"/>
-          <p:cNvPicPr>
-            <a:picLocks noChangeAspect="1"/>
-          </p:cNvPicPr>
-          <p:nvPr/>
-        </p:nvPicPr>
-        <p:blipFill>
-          <a:blip r:embed="rId5"/>
-          <a:stretch>
-            <a:fillRect/>
-          </a:stretch>
-        </p:blipFill>
-        <p:spPr>
-          <a:xfrm>
-            <a:off x="4572000" y="4114800"/>
             <a:ext cx="3657600" cy="2743200"/>
           </a:xfrm>
           <a:prstGeom prst="rect">
@@ -3663,7 +3471,7 @@
       </p:sp>
       <p:pic>
         <p:nvPicPr>
-          <p:cNvPr id="3" name="Picture 2" descr="ZS_Repurchase_of_Capital_Stock.png"/>
+          <p:cNvPr id="3" name="Picture 2" descr="CVX_Repurchase_of_Capital_Stock.png"/>
           <p:cNvPicPr>
             <a:picLocks noChangeAspect="1"/>
           </p:cNvPicPr>
@@ -3687,7 +3495,7 @@
       </p:pic>
       <p:pic>
         <p:nvPicPr>
-          <p:cNvPr id="4" name="Picture 3" descr="PANW_Repurchase_of_Capital_Stock.png"/>
+          <p:cNvPr id="4" name="Picture 3" descr="OXY_Repurchase_of_Capital_Stock.png"/>
           <p:cNvPicPr>
             <a:picLocks noChangeAspect="1"/>
           </p:cNvPicPr>
@@ -3702,6 +3510,30 @@
         <p:spPr>
           <a:xfrm>
             <a:off x="4572000" y="1371600"/>
+            <a:ext cx="3657600" cy="2743200"/>
+          </a:xfrm>
+          <a:prstGeom prst="rect">
+            <a:avLst/>
+          </a:prstGeom>
+        </p:spPr>
+      </p:pic>
+      <p:pic>
+        <p:nvPicPr>
+          <p:cNvPr id="5" name="Picture 4" descr="XOM_Repurchase_of_Capital_Stock.png"/>
+          <p:cNvPicPr>
+            <a:picLocks noChangeAspect="1"/>
+          </p:cNvPicPr>
+          <p:nvPr/>
+        </p:nvPicPr>
+        <p:blipFill>
+          <a:blip r:embed="rId4"/>
+          <a:stretch>
+            <a:fillRect/>
+          </a:stretch>
+        </p:blipFill>
+        <p:spPr>
+          <a:xfrm>
+            <a:off x="457200" y="4114800"/>
             <a:ext cx="3657600" cy="2743200"/>
           </a:xfrm>
           <a:prstGeom prst="rect">
@@ -3743,14 +3575,14 @@
           <a:lstStyle/>
           <a:p>
             <a:r>
-              <a:t>Gross Profit.png</a:t>
+              <a:t>Total Expenses.png</a:t>
             </a:r>
           </a:p>
         </p:txBody>
       </p:sp>
       <p:pic>
         <p:nvPicPr>
-          <p:cNvPr id="3" name="Picture 2" descr="CRWD_Gross_Profit.png"/>
+          <p:cNvPr id="3" name="Picture 2" descr="OXY_Total_Expenses.png"/>
           <p:cNvPicPr>
             <a:picLocks noChangeAspect="1"/>
           </p:cNvPicPr>
@@ -3774,7 +3606,7 @@
       </p:pic>
       <p:pic>
         <p:nvPicPr>
-          <p:cNvPr id="4" name="Picture 3" descr="PANW_Gross_Profit.png"/>
+          <p:cNvPr id="4" name="Picture 3" descr="CVX_Total_Expenses.png"/>
           <p:cNvPicPr>
             <a:picLocks noChangeAspect="1"/>
           </p:cNvPicPr>
@@ -3798,7 +3630,7 @@
       </p:pic>
       <p:pic>
         <p:nvPicPr>
-          <p:cNvPr id="5" name="Picture 4" descr="ZS_Gross_Profit.png"/>
+          <p:cNvPr id="5" name="Picture 4" descr="XOM_Total_Expenses.png"/>
           <p:cNvPicPr>
             <a:picLocks noChangeAspect="1"/>
           </p:cNvPicPr>
@@ -3813,30 +3645,6 @@
         <p:spPr>
           <a:xfrm>
             <a:off x="457200" y="4114800"/>
-            <a:ext cx="3657600" cy="2743200"/>
-          </a:xfrm>
-          <a:prstGeom prst="rect">
-            <a:avLst/>
-          </a:prstGeom>
-        </p:spPr>
-      </p:pic>
-      <p:pic>
-        <p:nvPicPr>
-          <p:cNvPr id="6" name="Picture 5" descr="S_Gross_Profit.png"/>
-          <p:cNvPicPr>
-            <a:picLocks noChangeAspect="1"/>
-          </p:cNvPicPr>
-          <p:nvPr/>
-        </p:nvPicPr>
-        <p:blipFill>
-          <a:blip r:embed="rId5"/>
-          <a:stretch>
-            <a:fillRect/>
-          </a:stretch>
-        </p:blipFill>
-        <p:spPr>
-          <a:xfrm>
-            <a:off x="4572000" y="4114800"/>
             <a:ext cx="3657600" cy="2743200"/>
           </a:xfrm>
           <a:prstGeom prst="rect">
@@ -3885,7 +3693,7 @@
       </p:sp>
       <p:pic>
         <p:nvPicPr>
-          <p:cNvPr id="3" name="Picture 2" descr="PANW_Basic_EPS.png"/>
+          <p:cNvPr id="3" name="Picture 2" descr="CVX_Basic_EPS.png"/>
           <p:cNvPicPr>
             <a:picLocks noChangeAspect="1"/>
           </p:cNvPicPr>
@@ -3909,7 +3717,7 @@
       </p:pic>
       <p:pic>
         <p:nvPicPr>
-          <p:cNvPr id="4" name="Picture 3" descr="ZS_Basic_EPS.png"/>
+          <p:cNvPr id="4" name="Picture 3" descr="OXY_Basic_EPS.png"/>
           <p:cNvPicPr>
             <a:picLocks noChangeAspect="1"/>
           </p:cNvPicPr>
@@ -3933,7 +3741,7 @@
       </p:pic>
       <p:pic>
         <p:nvPicPr>
-          <p:cNvPr id="5" name="Picture 4" descr="S_Basic_EPS.png"/>
+          <p:cNvPr id="5" name="Picture 4" descr="XOM_Basic_EPS.png"/>
           <p:cNvPicPr>
             <a:picLocks noChangeAspect="1"/>
           </p:cNvPicPr>
@@ -3948,30 +3756,6 @@
         <p:spPr>
           <a:xfrm>
             <a:off x="457200" y="4114800"/>
-            <a:ext cx="3657600" cy="2743200"/>
-          </a:xfrm>
-          <a:prstGeom prst="rect">
-            <a:avLst/>
-          </a:prstGeom>
-        </p:spPr>
-      </p:pic>
-      <p:pic>
-        <p:nvPicPr>
-          <p:cNvPr id="6" name="Picture 5" descr="CRWD_Basic_EPS.png"/>
-          <p:cNvPicPr>
-            <a:picLocks noChangeAspect="1"/>
-          </p:cNvPicPr>
-          <p:nvPr/>
-        </p:nvPicPr>
-        <p:blipFill>
-          <a:blip r:embed="rId5"/>
-          <a:stretch>
-            <a:fillRect/>
-          </a:stretch>
-        </p:blipFill>
-        <p:spPr>
-          <a:xfrm>
-            <a:off x="4572000" y="4114800"/>
             <a:ext cx="3657600" cy="2743200"/>
           </a:xfrm>
           <a:prstGeom prst="rect">
@@ -4013,14 +3797,14 @@
           <a:lstStyle/>
           <a:p>
             <a:r>
-              <a:t>Total Revenue.png</a:t>
+              <a:t>Cost of Revenue.png</a:t>
             </a:r>
           </a:p>
         </p:txBody>
       </p:sp>
       <p:pic>
         <p:nvPicPr>
-          <p:cNvPr id="3" name="Picture 2" descr="ZS_Total_Revenue.png"/>
+          <p:cNvPr id="3" name="Picture 2" descr="OXY_Cost_of_Revenue.png"/>
           <p:cNvPicPr>
             <a:picLocks noChangeAspect="1"/>
           </p:cNvPicPr>
@@ -4044,7 +3828,7 @@
       </p:pic>
       <p:pic>
         <p:nvPicPr>
-          <p:cNvPr id="4" name="Picture 3" descr="S_Total_Revenue.png"/>
+          <p:cNvPr id="4" name="Picture 3" descr="CVX_Cost_of_Revenue.png"/>
           <p:cNvPicPr>
             <a:picLocks noChangeAspect="1"/>
           </p:cNvPicPr>
@@ -4068,7 +3852,7 @@
       </p:pic>
       <p:pic>
         <p:nvPicPr>
-          <p:cNvPr id="5" name="Picture 4" descr="CRWD_Total_Revenue.png"/>
+          <p:cNvPr id="5" name="Picture 4" descr="XOM_Cost_of_Revenue.png"/>
           <p:cNvPicPr>
             <a:picLocks noChangeAspect="1"/>
           </p:cNvPicPr>
@@ -4083,30 +3867,6 @@
         <p:spPr>
           <a:xfrm>
             <a:off x="457200" y="4114800"/>
-            <a:ext cx="3657600" cy="2743200"/>
-          </a:xfrm>
-          <a:prstGeom prst="rect">
-            <a:avLst/>
-          </a:prstGeom>
-        </p:spPr>
-      </p:pic>
-      <p:pic>
-        <p:nvPicPr>
-          <p:cNvPr id="6" name="Picture 5" descr="PANW_Total_Revenue.png"/>
-          <p:cNvPicPr>
-            <a:picLocks noChangeAspect="1"/>
-          </p:cNvPicPr>
-          <p:nvPr/>
-        </p:nvPicPr>
-        <p:blipFill>
-          <a:blip r:embed="rId5"/>
-          <a:stretch>
-            <a:fillRect/>
-          </a:stretch>
-        </p:blipFill>
-        <p:spPr>
-          <a:xfrm>
-            <a:off x="4572000" y="4114800"/>
             <a:ext cx="3657600" cy="2743200"/>
           </a:xfrm>
           <a:prstGeom prst="rect">
@@ -4155,7 +3915,7 @@
       </p:sp>
       <p:pic>
         <p:nvPicPr>
-          <p:cNvPr id="3" name="Picture 2" descr="CRWD_Net_Income_Common_Stockholders.png"/>
+          <p:cNvPr id="3" name="Picture 2" descr="OXY_Net_Income_Common_Stockholders.png"/>
           <p:cNvPicPr>
             <a:picLocks noChangeAspect="1"/>
           </p:cNvPicPr>
@@ -4179,7 +3939,7 @@
       </p:pic>
       <p:pic>
         <p:nvPicPr>
-          <p:cNvPr id="4" name="Picture 3" descr="ZS_Net_Income_Common_Stockholders.png"/>
+          <p:cNvPr id="4" name="Picture 3" descr="XOM_Net_Income_Common_Stockholders.png"/>
           <p:cNvPicPr>
             <a:picLocks noChangeAspect="1"/>
           </p:cNvPicPr>
@@ -4203,7 +3963,7 @@
       </p:pic>
       <p:pic>
         <p:nvPicPr>
-          <p:cNvPr id="5" name="Picture 4" descr="PANW_Net_Income_Common_Stockholders.png"/>
+          <p:cNvPr id="5" name="Picture 4" descr="CVX_Net_Income_Common_Stockholders.png"/>
           <p:cNvPicPr>
             <a:picLocks noChangeAspect="1"/>
           </p:cNvPicPr>
@@ -4218,30 +3978,6 @@
         <p:spPr>
           <a:xfrm>
             <a:off x="457200" y="4114800"/>
-            <a:ext cx="3657600" cy="2743200"/>
-          </a:xfrm>
-          <a:prstGeom prst="rect">
-            <a:avLst/>
-          </a:prstGeom>
-        </p:spPr>
-      </p:pic>
-      <p:pic>
-        <p:nvPicPr>
-          <p:cNvPr id="6" name="Picture 5" descr="S_Net_Income_Common_Stockholders.png"/>
-          <p:cNvPicPr>
-            <a:picLocks noChangeAspect="1"/>
-          </p:cNvPicPr>
-          <p:nvPr/>
-        </p:nvPicPr>
-        <p:blipFill>
-          <a:blip r:embed="rId5"/>
-          <a:stretch>
-            <a:fillRect/>
-          </a:stretch>
-        </p:blipFill>
-        <p:spPr>
-          <a:xfrm>
-            <a:off x="4572000" y="4114800"/>
             <a:ext cx="3657600" cy="2743200"/>
           </a:xfrm>
           <a:prstGeom prst="rect">
@@ -4283,14 +4019,14 @@
           <a:lstStyle/>
           <a:p>
             <a:r>
-              <a:t>Basic Average Shares.png</a:t>
+              <a:t>Total Revenue.png</a:t>
             </a:r>
           </a:p>
         </p:txBody>
       </p:sp>
       <p:pic>
         <p:nvPicPr>
-          <p:cNvPr id="3" name="Picture 2" descr="PANW_Basic_Average_Shares.png"/>
+          <p:cNvPr id="3" name="Picture 2" descr="XOM_Total_Revenue.png"/>
           <p:cNvPicPr>
             <a:picLocks noChangeAspect="1"/>
           </p:cNvPicPr>
@@ -4314,7 +4050,7 @@
       </p:pic>
       <p:pic>
         <p:nvPicPr>
-          <p:cNvPr id="4" name="Picture 3" descr="CRWD_Basic_Average_Shares.png"/>
+          <p:cNvPr id="4" name="Picture 3" descr="CVX_Total_Revenue.png"/>
           <p:cNvPicPr>
             <a:picLocks noChangeAspect="1"/>
           </p:cNvPicPr>
@@ -4338,7 +4074,7 @@
       </p:pic>
       <p:pic>
         <p:nvPicPr>
-          <p:cNvPr id="5" name="Picture 4" descr="ZS_Basic_Average_Shares.png"/>
+          <p:cNvPr id="5" name="Picture 4" descr="OXY_Total_Revenue.png"/>
           <p:cNvPicPr>
             <a:picLocks noChangeAspect="1"/>
           </p:cNvPicPr>
@@ -4353,30 +4089,6 @@
         <p:spPr>
           <a:xfrm>
             <a:off x="457200" y="4114800"/>
-            <a:ext cx="3657600" cy="2743200"/>
-          </a:xfrm>
-          <a:prstGeom prst="rect">
-            <a:avLst/>
-          </a:prstGeom>
-        </p:spPr>
-      </p:pic>
-      <p:pic>
-        <p:nvPicPr>
-          <p:cNvPr id="6" name="Picture 5" descr="S_Basic_Average_Shares.png"/>
-          <p:cNvPicPr>
-            <a:picLocks noChangeAspect="1"/>
-          </p:cNvPicPr>
-          <p:nvPr/>
-        </p:nvPicPr>
-        <p:blipFill>
-          <a:blip r:embed="rId5"/>
-          <a:stretch>
-            <a:fillRect/>
-          </a:stretch>
-        </p:blipFill>
-        <p:spPr>
-          <a:xfrm>
-            <a:off x="4572000" y="4114800"/>
             <a:ext cx="3657600" cy="2743200"/>
           </a:xfrm>
           <a:prstGeom prst="rect">
@@ -4418,14 +4130,14 @@
           <a:lstStyle/>
           <a:p>
             <a:r>
-              <a:t>Total Expenses.png</a:t>
+              <a:t>Gross Profit.png</a:t>
             </a:r>
           </a:p>
         </p:txBody>
       </p:sp>
       <p:pic>
         <p:nvPicPr>
-          <p:cNvPr id="3" name="Picture 2" descr="S_Total_Expenses.png"/>
+          <p:cNvPr id="3" name="Picture 2" descr="OXY_Gross_Profit.png"/>
           <p:cNvPicPr>
             <a:picLocks noChangeAspect="1"/>
           </p:cNvPicPr>
@@ -4449,7 +4161,7 @@
       </p:pic>
       <p:pic>
         <p:nvPicPr>
-          <p:cNvPr id="4" name="Picture 3" descr="PANW_Total_Expenses.png"/>
+          <p:cNvPr id="4" name="Picture 3" descr="CVX_Gross_Profit.png"/>
           <p:cNvPicPr>
             <a:picLocks noChangeAspect="1"/>
           </p:cNvPicPr>
@@ -4473,7 +4185,7 @@
       </p:pic>
       <p:pic>
         <p:nvPicPr>
-          <p:cNvPr id="5" name="Picture 4" descr="ZS_Total_Expenses.png"/>
+          <p:cNvPr id="5" name="Picture 4" descr="XOM_Gross_Profit.png"/>
           <p:cNvPicPr>
             <a:picLocks noChangeAspect="1"/>
           </p:cNvPicPr>
@@ -4488,30 +4200,6 @@
         <p:spPr>
           <a:xfrm>
             <a:off x="457200" y="4114800"/>
-            <a:ext cx="3657600" cy="2743200"/>
-          </a:xfrm>
-          <a:prstGeom prst="rect">
-            <a:avLst/>
-          </a:prstGeom>
-        </p:spPr>
-      </p:pic>
-      <p:pic>
-        <p:nvPicPr>
-          <p:cNvPr id="6" name="Picture 5" descr="CRWD_Total_Expenses.png"/>
-          <p:cNvPicPr>
-            <a:picLocks noChangeAspect="1"/>
-          </p:cNvPicPr>
-          <p:nvPr/>
-        </p:nvPicPr>
-        <p:blipFill>
-          <a:blip r:embed="rId5"/>
-          <a:stretch>
-            <a:fillRect/>
-          </a:stretch>
-        </p:blipFill>
-        <p:spPr>
-          <a:xfrm>
-            <a:off x="4572000" y="4114800"/>
             <a:ext cx="3657600" cy="2743200"/>
           </a:xfrm>
           <a:prstGeom prst="rect">
@@ -4553,14 +4241,14 @@
           <a:lstStyle/>
           <a:p>
             <a:r>
-              <a:t>Ordinary Shares Number.png</a:t>
+              <a:t>Total Assets.png</a:t>
             </a:r>
           </a:p>
         </p:txBody>
       </p:sp>
       <p:pic>
         <p:nvPicPr>
-          <p:cNvPr id="3" name="Picture 2" descr="CRWD_Ordinary_Shares_Number.png"/>
+          <p:cNvPr id="3" name="Picture 2" descr="CVX_Total_Assets.png"/>
           <p:cNvPicPr>
             <a:picLocks noChangeAspect="1"/>
           </p:cNvPicPr>
@@ -4575,78 +4263,6 @@
         <p:spPr>
           <a:xfrm>
             <a:off x="457200" y="1371600"/>
-            <a:ext cx="3657600" cy="2743200"/>
-          </a:xfrm>
-          <a:prstGeom prst="rect">
-            <a:avLst/>
-          </a:prstGeom>
-        </p:spPr>
-      </p:pic>
-      <p:pic>
-        <p:nvPicPr>
-          <p:cNvPr id="4" name="Picture 3" descr="PANW_Ordinary_Shares_Number.png"/>
-          <p:cNvPicPr>
-            <a:picLocks noChangeAspect="1"/>
-          </p:cNvPicPr>
-          <p:nvPr/>
-        </p:nvPicPr>
-        <p:blipFill>
-          <a:blip r:embed="rId3"/>
-          <a:stretch>
-            <a:fillRect/>
-          </a:stretch>
-        </p:blipFill>
-        <p:spPr>
-          <a:xfrm>
-            <a:off x="4572000" y="1371600"/>
-            <a:ext cx="3657600" cy="2743200"/>
-          </a:xfrm>
-          <a:prstGeom prst="rect">
-            <a:avLst/>
-          </a:prstGeom>
-        </p:spPr>
-      </p:pic>
-      <p:pic>
-        <p:nvPicPr>
-          <p:cNvPr id="5" name="Picture 4" descr="S_Ordinary_Shares_Number.png"/>
-          <p:cNvPicPr>
-            <a:picLocks noChangeAspect="1"/>
-          </p:cNvPicPr>
-          <p:nvPr/>
-        </p:nvPicPr>
-        <p:blipFill>
-          <a:blip r:embed="rId4"/>
-          <a:stretch>
-            <a:fillRect/>
-          </a:stretch>
-        </p:blipFill>
-        <p:spPr>
-          <a:xfrm>
-            <a:off x="457200" y="4114800"/>
-            <a:ext cx="3657600" cy="2743200"/>
-          </a:xfrm>
-          <a:prstGeom prst="rect">
-            <a:avLst/>
-          </a:prstGeom>
-        </p:spPr>
-      </p:pic>
-      <p:pic>
-        <p:nvPicPr>
-          <p:cNvPr id="6" name="Picture 5" descr="ZS_Ordinary_Shares_Number.png"/>
-          <p:cNvPicPr>
-            <a:picLocks noChangeAspect="1"/>
-          </p:cNvPicPr>
-          <p:nvPr/>
-        </p:nvPicPr>
-        <p:blipFill>
-          <a:blip r:embed="rId5"/>
-          <a:stretch>
-            <a:fillRect/>
-          </a:stretch>
-        </p:blipFill>
-        <p:spPr>
-          <a:xfrm>
-            <a:off x="4572000" y="4114800"/>
             <a:ext cx="3657600" cy="2743200"/>
           </a:xfrm>
           <a:prstGeom prst="rect">
@@ -4688,14 +4304,14 @@
           <a:lstStyle/>
           <a:p>
             <a:r>
-              <a:t>Total Capitalization.png</a:t>
+              <a:t>Total Debt.png</a:t>
             </a:r>
           </a:p>
         </p:txBody>
       </p:sp>
       <p:pic>
         <p:nvPicPr>
-          <p:cNvPr id="3" name="Picture 2" descr="PANW_Total_Capitalization.png"/>
+          <p:cNvPr id="3" name="Picture 2" descr="CVX_Total_Debt.png"/>
           <p:cNvPicPr>
             <a:picLocks noChangeAspect="1"/>
           </p:cNvPicPr>
@@ -4710,78 +4326,6 @@
         <p:spPr>
           <a:xfrm>
             <a:off x="457200" y="1371600"/>
-            <a:ext cx="3657600" cy="2743200"/>
-          </a:xfrm>
-          <a:prstGeom prst="rect">
-            <a:avLst/>
-          </a:prstGeom>
-        </p:spPr>
-      </p:pic>
-      <p:pic>
-        <p:nvPicPr>
-          <p:cNvPr id="4" name="Picture 3" descr="CRWD_Total_Capitalization.png"/>
-          <p:cNvPicPr>
-            <a:picLocks noChangeAspect="1"/>
-          </p:cNvPicPr>
-          <p:nvPr/>
-        </p:nvPicPr>
-        <p:blipFill>
-          <a:blip r:embed="rId3"/>
-          <a:stretch>
-            <a:fillRect/>
-          </a:stretch>
-        </p:blipFill>
-        <p:spPr>
-          <a:xfrm>
-            <a:off x="4572000" y="1371600"/>
-            <a:ext cx="3657600" cy="2743200"/>
-          </a:xfrm>
-          <a:prstGeom prst="rect">
-            <a:avLst/>
-          </a:prstGeom>
-        </p:spPr>
-      </p:pic>
-      <p:pic>
-        <p:nvPicPr>
-          <p:cNvPr id="5" name="Picture 4" descr="ZS_Total_Capitalization.png"/>
-          <p:cNvPicPr>
-            <a:picLocks noChangeAspect="1"/>
-          </p:cNvPicPr>
-          <p:nvPr/>
-        </p:nvPicPr>
-        <p:blipFill>
-          <a:blip r:embed="rId4"/>
-          <a:stretch>
-            <a:fillRect/>
-          </a:stretch>
-        </p:blipFill>
-        <p:spPr>
-          <a:xfrm>
-            <a:off x="457200" y="4114800"/>
-            <a:ext cx="3657600" cy="2743200"/>
-          </a:xfrm>
-          <a:prstGeom prst="rect">
-            <a:avLst/>
-          </a:prstGeom>
-        </p:spPr>
-      </p:pic>
-      <p:pic>
-        <p:nvPicPr>
-          <p:cNvPr id="6" name="Picture 5" descr="S_Total_Capitalization.png"/>
-          <p:cNvPicPr>
-            <a:picLocks noChangeAspect="1"/>
-          </p:cNvPicPr>
-          <p:nvPr/>
-        </p:nvPicPr>
-        <p:blipFill>
-          <a:blip r:embed="rId5"/>
-          <a:stretch>
-            <a:fillRect/>
-          </a:stretch>
-        </p:blipFill>
-        <p:spPr>
-          <a:xfrm>
-            <a:off x="4572000" y="4114800"/>
             <a:ext cx="3657600" cy="2743200"/>
           </a:xfrm>
           <a:prstGeom prst="rect">

</xml_diff>